<commit_message>
updating bipartite files for release
</commit_message>
<xml_diff>
--- a/Figures/Bipartite_figures/bipartitefigures_2024_08_02.pptx
+++ b/Figures/Bipartite_figures/bipartitefigures_2024_08_02.pptx
@@ -6,6 +6,7 @@
   </p:sldMasterIdLst>
   <p:sldIdLst>
     <p:sldId id="256" r:id="rId2"/>
+    <p:sldId id="257" r:id="rId3"/>
   </p:sldIdLst>
   <p:sldSz cx="12192000" cy="6858000"/>
   <p:notesSz cx="6858000" cy="9144000"/>
@@ -104,6 +105,11 @@
       </a:defRPr>
     </a:lvl9pPr>
   </p:defaultTextStyle>
+  <p:extLst>
+    <p:ext uri="{EFAFB233-063F-42B5-8137-9DF3F51BA10A}">
+      <p15:sldGuideLst xmlns:p15="http://schemas.microsoft.com/office/powerpoint/2012/main"/>
+    </p:ext>
+  </p:extLst>
 </p:presentation>
 </file>
 
@@ -254,7 +260,7 @@
           <a:p>
             <a:fld id="{6A9121D0-9D5F-5741-A50D-EF9036AC9E45}" type="datetimeFigureOut">
               <a:rPr lang="en-US" smtClean="0"/>
-              <a:t>8/2/24</a:t>
+              <a:t>8/29/24</a:t>
             </a:fld>
             <a:endParaRPr lang="en-US"/>
           </a:p>
@@ -452,7 +458,7 @@
           <a:p>
             <a:fld id="{6A9121D0-9D5F-5741-A50D-EF9036AC9E45}" type="datetimeFigureOut">
               <a:rPr lang="en-US" smtClean="0"/>
-              <a:t>8/2/24</a:t>
+              <a:t>8/29/24</a:t>
             </a:fld>
             <a:endParaRPr lang="en-US"/>
           </a:p>
@@ -660,7 +666,7 @@
           <a:p>
             <a:fld id="{6A9121D0-9D5F-5741-A50D-EF9036AC9E45}" type="datetimeFigureOut">
               <a:rPr lang="en-US" smtClean="0"/>
-              <a:t>8/2/24</a:t>
+              <a:t>8/29/24</a:t>
             </a:fld>
             <a:endParaRPr lang="en-US"/>
           </a:p>
@@ -858,7 +864,7 @@
           <a:p>
             <a:fld id="{6A9121D0-9D5F-5741-A50D-EF9036AC9E45}" type="datetimeFigureOut">
               <a:rPr lang="en-US" smtClean="0"/>
-              <a:t>8/2/24</a:t>
+              <a:t>8/29/24</a:t>
             </a:fld>
             <a:endParaRPr lang="en-US"/>
           </a:p>
@@ -1133,7 +1139,7 @@
           <a:p>
             <a:fld id="{6A9121D0-9D5F-5741-A50D-EF9036AC9E45}" type="datetimeFigureOut">
               <a:rPr lang="en-US" smtClean="0"/>
-              <a:t>8/2/24</a:t>
+              <a:t>8/29/24</a:t>
             </a:fld>
             <a:endParaRPr lang="en-US"/>
           </a:p>
@@ -1398,7 +1404,7 @@
           <a:p>
             <a:fld id="{6A9121D0-9D5F-5741-A50D-EF9036AC9E45}" type="datetimeFigureOut">
               <a:rPr lang="en-US" smtClean="0"/>
-              <a:t>8/2/24</a:t>
+              <a:t>8/29/24</a:t>
             </a:fld>
             <a:endParaRPr lang="en-US"/>
           </a:p>
@@ -1810,7 +1816,7 @@
           <a:p>
             <a:fld id="{6A9121D0-9D5F-5741-A50D-EF9036AC9E45}" type="datetimeFigureOut">
               <a:rPr lang="en-US" smtClean="0"/>
-              <a:t>8/2/24</a:t>
+              <a:t>8/29/24</a:t>
             </a:fld>
             <a:endParaRPr lang="en-US"/>
           </a:p>
@@ -1951,7 +1957,7 @@
           <a:p>
             <a:fld id="{6A9121D0-9D5F-5741-A50D-EF9036AC9E45}" type="datetimeFigureOut">
               <a:rPr lang="en-US" smtClean="0"/>
-              <a:t>8/2/24</a:t>
+              <a:t>8/29/24</a:t>
             </a:fld>
             <a:endParaRPr lang="en-US"/>
           </a:p>
@@ -2064,7 +2070,7 @@
           <a:p>
             <a:fld id="{6A9121D0-9D5F-5741-A50D-EF9036AC9E45}" type="datetimeFigureOut">
               <a:rPr lang="en-US" smtClean="0"/>
-              <a:t>8/2/24</a:t>
+              <a:t>8/29/24</a:t>
             </a:fld>
             <a:endParaRPr lang="en-US"/>
           </a:p>
@@ -2375,7 +2381,7 @@
           <a:p>
             <a:fld id="{6A9121D0-9D5F-5741-A50D-EF9036AC9E45}" type="datetimeFigureOut">
               <a:rPr lang="en-US" smtClean="0"/>
-              <a:t>8/2/24</a:t>
+              <a:t>8/29/24</a:t>
             </a:fld>
             <a:endParaRPr lang="en-US"/>
           </a:p>
@@ -2663,7 +2669,7 @@
           <a:p>
             <a:fld id="{6A9121D0-9D5F-5741-A50D-EF9036AC9E45}" type="datetimeFigureOut">
               <a:rPr lang="en-US" smtClean="0"/>
-              <a:t>8/2/24</a:t>
+              <a:t>8/29/24</a:t>
             </a:fld>
             <a:endParaRPr lang="en-US"/>
           </a:p>
@@ -2904,7 +2910,7 @@
           <a:p>
             <a:fld id="{6A9121D0-9D5F-5741-A50D-EF9036AC9E45}" type="datetimeFigureOut">
               <a:rPr lang="en-US" smtClean="0"/>
-              <a:t>8/2/24</a:t>
+              <a:t>8/29/24</a:t>
             </a:fld>
             <a:endParaRPr lang="en-US"/>
           </a:p>
@@ -3323,10 +3329,10 @@
       </p:grpSpPr>
       <p:grpSp>
         <p:nvGrpSpPr>
-          <p:cNvPr id="10" name="Group 9">
-            <a:extLst>
-              <a:ext uri="{FF2B5EF4-FFF2-40B4-BE49-F238E27FC236}">
-                <a16:creationId xmlns:a16="http://schemas.microsoft.com/office/drawing/2014/main" id="{737EB226-0B27-F894-C298-EEDAAFB0BEF0}"/>
+          <p:cNvPr id="11" name="Group 10">
+            <a:extLst>
+              <a:ext uri="{FF2B5EF4-FFF2-40B4-BE49-F238E27FC236}">
+                <a16:creationId xmlns:a16="http://schemas.microsoft.com/office/drawing/2014/main" id="{7CAC3360-A1D6-7DD0-0B63-E4C9A39486AA}"/>
               </a:ext>
             </a:extLst>
           </p:cNvPr>
@@ -3335,72 +3341,12 @@
         </p:nvGrpSpPr>
         <p:grpSpPr>
           <a:xfrm>
-            <a:off x="2539724" y="-914401"/>
-            <a:ext cx="6800772" cy="7772401"/>
-            <a:chOff x="2539724" y="-914401"/>
-            <a:chExt cx="6800772" cy="7772401"/>
+            <a:off x="2539724" y="-914402"/>
+            <a:ext cx="6615070" cy="11279428"/>
+            <a:chOff x="2539724" y="-914402"/>
+            <a:chExt cx="6615070" cy="11279428"/>
           </a:xfrm>
         </p:grpSpPr>
-        <p:pic>
-          <p:nvPicPr>
-            <p:cNvPr id="5" name="Picture 4" descr="A close-up of a bar code&#10;&#10;Description automatically generated">
-              <a:extLst>
-                <a:ext uri="{FF2B5EF4-FFF2-40B4-BE49-F238E27FC236}">
-                  <a16:creationId xmlns:a16="http://schemas.microsoft.com/office/drawing/2014/main" id="{F362BD59-F894-A858-20C5-58AF706F9437}"/>
-                </a:ext>
-              </a:extLst>
-            </p:cNvPr>
-            <p:cNvPicPr>
-              <a:picLocks noChangeAspect="1"/>
-            </p:cNvPicPr>
-            <p:nvPr/>
-          </p:nvPicPr>
-          <p:blipFill>
-            <a:blip r:embed="rId2"/>
-            <a:stretch>
-              <a:fillRect/>
-            </a:stretch>
-          </p:blipFill>
-          <p:spPr>
-            <a:xfrm rot="5400000">
-              <a:off x="275772" y="1349552"/>
-              <a:ext cx="7772400" cy="3244496"/>
-            </a:xfrm>
-            <a:prstGeom prst="rect">
-              <a:avLst/>
-            </a:prstGeom>
-          </p:spPr>
-        </p:pic>
-        <p:pic>
-          <p:nvPicPr>
-            <p:cNvPr id="7" name="Picture 6" descr="A diagram of a barcode&#10;&#10;Description automatically generated">
-              <a:extLst>
-                <a:ext uri="{FF2B5EF4-FFF2-40B4-BE49-F238E27FC236}">
-                  <a16:creationId xmlns:a16="http://schemas.microsoft.com/office/drawing/2014/main" id="{21606CE0-3F01-9BAA-02FB-0CE7CDE2A218}"/>
-                </a:ext>
-              </a:extLst>
-            </p:cNvPr>
-            <p:cNvPicPr>
-              <a:picLocks noChangeAspect="1"/>
-            </p:cNvPicPr>
-            <p:nvPr/>
-          </p:nvPicPr>
-          <p:blipFill>
-            <a:blip r:embed="rId3"/>
-            <a:stretch>
-              <a:fillRect/>
-            </a:stretch>
-          </p:blipFill>
-          <p:spPr>
-            <a:xfrm rot="5400000">
-              <a:off x="3832048" y="1349552"/>
-              <a:ext cx="7772400" cy="3244496"/>
-            </a:xfrm>
-            <a:prstGeom prst="rect">
-              <a:avLst/>
-            </a:prstGeom>
-          </p:spPr>
-        </p:pic>
         <p:sp>
           <p:nvSpPr>
             <p:cNvPr id="8" name="TextBox 7">
@@ -3471,11 +3417,258 @@
             </a:p>
           </p:txBody>
         </p:sp>
+        <p:pic>
+          <p:nvPicPr>
+            <p:cNvPr id="3" name="Picture 2" descr="A close-up of a chart&#10;&#10;Description automatically generated">
+              <a:extLst>
+                <a:ext uri="{FF2B5EF4-FFF2-40B4-BE49-F238E27FC236}">
+                  <a16:creationId xmlns:a16="http://schemas.microsoft.com/office/drawing/2014/main" id="{54EC6683-F152-C64A-BEBB-41C24A0059BF}"/>
+                </a:ext>
+              </a:extLst>
+            </p:cNvPr>
+            <p:cNvPicPr>
+              <a:picLocks noChangeAspect="1"/>
+            </p:cNvPicPr>
+            <p:nvPr/>
+          </p:nvPicPr>
+          <p:blipFill>
+            <a:blip r:embed="rId2"/>
+            <a:stretch>
+              <a:fillRect/>
+            </a:stretch>
+          </p:blipFill>
+          <p:spPr>
+            <a:xfrm rot="5400000">
+              <a:off x="2101867" y="3312098"/>
+              <a:ext cx="11279426" cy="2826429"/>
+            </a:xfrm>
+            <a:prstGeom prst="rect">
+              <a:avLst/>
+            </a:prstGeom>
+          </p:spPr>
+        </p:pic>
+        <p:pic>
+          <p:nvPicPr>
+            <p:cNvPr id="6" name="Picture 5" descr="A close-up of a chart&#10;&#10;Description automatically generated">
+              <a:extLst>
+                <a:ext uri="{FF2B5EF4-FFF2-40B4-BE49-F238E27FC236}">
+                  <a16:creationId xmlns:a16="http://schemas.microsoft.com/office/drawing/2014/main" id="{AD47207B-6371-1382-1600-BC95AAAF886B}"/>
+                </a:ext>
+              </a:extLst>
+            </p:cNvPr>
+            <p:cNvPicPr>
+              <a:picLocks noChangeAspect="1"/>
+            </p:cNvPicPr>
+            <p:nvPr/>
+          </p:nvPicPr>
+          <p:blipFill>
+            <a:blip r:embed="rId3"/>
+            <a:stretch>
+              <a:fillRect/>
+            </a:stretch>
+          </p:blipFill>
+          <p:spPr>
+            <a:xfrm rot="5400000">
+              <a:off x="-1189295" y="3312096"/>
+              <a:ext cx="11279426" cy="2826429"/>
+            </a:xfrm>
+            <a:prstGeom prst="rect">
+              <a:avLst/>
+            </a:prstGeom>
+          </p:spPr>
+        </p:pic>
       </p:grpSp>
     </p:spTree>
     <p:extLst>
       <p:ext uri="{BB962C8B-B14F-4D97-AF65-F5344CB8AC3E}">
         <p14:creationId xmlns:p14="http://schemas.microsoft.com/office/powerpoint/2010/main" val="150094522"/>
+      </p:ext>
+    </p:extLst>
+  </p:cSld>
+  <p:clrMapOvr>
+    <a:masterClrMapping/>
+  </p:clrMapOvr>
+</p:sld>
+</file>
+
+<file path=ppt/slides/slide2.xml><?xml version="1.0" encoding="utf-8"?>
+<p:sld xmlns:a="http://schemas.openxmlformats.org/drawingml/2006/main" xmlns:r="http://schemas.openxmlformats.org/officeDocument/2006/relationships" xmlns:p="http://schemas.openxmlformats.org/presentationml/2006/main">
+  <p:cSld>
+    <p:spTree>
+      <p:nvGrpSpPr>
+        <p:cNvPr id="1" name="">
+          <a:extLst>
+            <a:ext uri="{FF2B5EF4-FFF2-40B4-BE49-F238E27FC236}">
+              <a16:creationId xmlns:a16="http://schemas.microsoft.com/office/drawing/2014/main" id="{A81D4E70-FDBB-5F2E-DE3E-B2B083FE045E}"/>
+            </a:ext>
+          </a:extLst>
+        </p:cNvPr>
+        <p:cNvGrpSpPr/>
+        <p:nvPr/>
+      </p:nvGrpSpPr>
+      <p:grpSpPr>
+        <a:xfrm>
+          <a:off x="0" y="0"/>
+          <a:ext cx="0" cy="0"/>
+          <a:chOff x="0" y="0"/>
+          <a:chExt cx="0" cy="0"/>
+        </a:xfrm>
+      </p:grpSpPr>
+      <p:grpSp>
+        <p:nvGrpSpPr>
+          <p:cNvPr id="10" name="Group 9">
+            <a:extLst>
+              <a:ext uri="{FF2B5EF4-FFF2-40B4-BE49-F238E27FC236}">
+                <a16:creationId xmlns:a16="http://schemas.microsoft.com/office/drawing/2014/main" id="{5A9615F1-7BE3-B0EB-6F38-4EED54CE692B}"/>
+              </a:ext>
+            </a:extLst>
+          </p:cNvPr>
+          <p:cNvGrpSpPr/>
+          <p:nvPr/>
+        </p:nvGrpSpPr>
+        <p:grpSpPr>
+          <a:xfrm>
+            <a:off x="2539724" y="-914401"/>
+            <a:ext cx="6800772" cy="7772401"/>
+            <a:chOff x="2539724" y="-914401"/>
+            <a:chExt cx="6800772" cy="7772401"/>
+          </a:xfrm>
+        </p:grpSpPr>
+        <p:pic>
+          <p:nvPicPr>
+            <p:cNvPr id="5" name="Picture 4" descr="A close-up of a bar code&#10;&#10;Description automatically generated">
+              <a:extLst>
+                <a:ext uri="{FF2B5EF4-FFF2-40B4-BE49-F238E27FC236}">
+                  <a16:creationId xmlns:a16="http://schemas.microsoft.com/office/drawing/2014/main" id="{E3C923FE-C3B6-F92A-EFBA-EFC5C2BCA4F1}"/>
+                </a:ext>
+              </a:extLst>
+            </p:cNvPr>
+            <p:cNvPicPr>
+              <a:picLocks noChangeAspect="1"/>
+            </p:cNvPicPr>
+            <p:nvPr/>
+          </p:nvPicPr>
+          <p:blipFill>
+            <a:blip r:embed="rId2"/>
+            <a:stretch>
+              <a:fillRect/>
+            </a:stretch>
+          </p:blipFill>
+          <p:spPr>
+            <a:xfrm rot="5400000">
+              <a:off x="275772" y="1349552"/>
+              <a:ext cx="7772400" cy="3244496"/>
+            </a:xfrm>
+            <a:prstGeom prst="rect">
+              <a:avLst/>
+            </a:prstGeom>
+          </p:spPr>
+        </p:pic>
+        <p:pic>
+          <p:nvPicPr>
+            <p:cNvPr id="7" name="Picture 6" descr="A diagram of a barcode&#10;&#10;Description automatically generated">
+              <a:extLst>
+                <a:ext uri="{FF2B5EF4-FFF2-40B4-BE49-F238E27FC236}">
+                  <a16:creationId xmlns:a16="http://schemas.microsoft.com/office/drawing/2014/main" id="{B1E9837D-7933-AD54-283F-DBA4C211AFEE}"/>
+                </a:ext>
+              </a:extLst>
+            </p:cNvPr>
+            <p:cNvPicPr>
+              <a:picLocks noChangeAspect="1"/>
+            </p:cNvPicPr>
+            <p:nvPr/>
+          </p:nvPicPr>
+          <p:blipFill>
+            <a:blip r:embed="rId3"/>
+            <a:stretch>
+              <a:fillRect/>
+            </a:stretch>
+          </p:blipFill>
+          <p:spPr>
+            <a:xfrm rot="5400000">
+              <a:off x="3832048" y="1349552"/>
+              <a:ext cx="7772400" cy="3244496"/>
+            </a:xfrm>
+            <a:prstGeom prst="rect">
+              <a:avLst/>
+            </a:prstGeom>
+          </p:spPr>
+        </p:pic>
+        <p:sp>
+          <p:nvSpPr>
+            <p:cNvPr id="8" name="TextBox 7">
+              <a:extLst>
+                <a:ext uri="{FF2B5EF4-FFF2-40B4-BE49-F238E27FC236}">
+                  <a16:creationId xmlns:a16="http://schemas.microsoft.com/office/drawing/2014/main" id="{5D8BD771-ACD1-5FC5-D28B-5D2EFE51EF57}"/>
+                </a:ext>
+              </a:extLst>
+            </p:cNvPr>
+            <p:cNvSpPr txBox="1"/>
+            <p:nvPr/>
+          </p:nvSpPr>
+          <p:spPr>
+            <a:xfrm>
+              <a:off x="2539724" y="-914400"/>
+              <a:ext cx="464733" cy="377371"/>
+            </a:xfrm>
+            <a:prstGeom prst="rect">
+              <a:avLst/>
+            </a:prstGeom>
+            <a:noFill/>
+          </p:spPr>
+          <p:txBody>
+            <a:bodyPr wrap="square" rtlCol="0">
+              <a:spAutoFit/>
+            </a:bodyPr>
+            <a:lstStyle/>
+            <a:p>
+              <a:r>
+                <a:rPr lang="en-US" dirty="0"/>
+                <a:t>(A)</a:t>
+              </a:r>
+            </a:p>
+          </p:txBody>
+        </p:sp>
+        <p:sp>
+          <p:nvSpPr>
+            <p:cNvPr id="9" name="TextBox 8">
+              <a:extLst>
+                <a:ext uri="{FF2B5EF4-FFF2-40B4-BE49-F238E27FC236}">
+                  <a16:creationId xmlns:a16="http://schemas.microsoft.com/office/drawing/2014/main" id="{10215F25-EA46-9219-3D4E-6CAA9D4F59CE}"/>
+                </a:ext>
+              </a:extLst>
+            </p:cNvPr>
+            <p:cNvSpPr txBox="1"/>
+            <p:nvPr/>
+          </p:nvSpPr>
+          <p:spPr>
+            <a:xfrm>
+              <a:off x="5863633" y="-914401"/>
+              <a:ext cx="464733" cy="377371"/>
+            </a:xfrm>
+            <a:prstGeom prst="rect">
+              <a:avLst/>
+            </a:prstGeom>
+            <a:noFill/>
+          </p:spPr>
+          <p:txBody>
+            <a:bodyPr wrap="square" rtlCol="0">
+              <a:spAutoFit/>
+            </a:bodyPr>
+            <a:lstStyle/>
+            <a:p>
+              <a:r>
+                <a:rPr lang="en-US" dirty="0"/>
+                <a:t>(B)</a:t>
+              </a:r>
+            </a:p>
+          </p:txBody>
+        </p:sp>
+      </p:grpSp>
+    </p:spTree>
+    <p:extLst>
+      <p:ext uri="{BB962C8B-B14F-4D97-AF65-F5344CB8AC3E}">
+        <p14:creationId xmlns:p14="http://schemas.microsoft.com/office/powerpoint/2010/main" val="1999172947"/>
       </p:ext>
     </p:extLst>
   </p:cSld>

</xml_diff>